<commit_message>
docs: update architecture presentation — included refined system diagrams and clean layout
</commit_message>
<xml_diff>
--- a/docs/Cloudimart_System_Architecture.pptx
+++ b/docs/Cloudimart_System_Architecture.pptx
@@ -936,7 +936,7 @@
           <a:p>
             <a:fld id="{5BCAD085-E8A6-8845-BD4E-CB4CCA059FC4}" type="datetimeFigureOut">
               <a:rPr lang="en-US" smtClean="0"/>
-              <a:t>2/20/2026</a:t>
+              <a:t>2/21/2026</a:t>
             </a:fld>
             <a:endParaRPr lang="en-US"/>
           </a:p>
@@ -1187,7 +1187,7 @@
           <a:p>
             <a:fld id="{5BCAD085-E8A6-8845-BD4E-CB4CCA059FC4}" type="datetimeFigureOut">
               <a:rPr lang="en-US" smtClean="0"/>
-              <a:t>2/20/2026</a:t>
+              <a:t>2/21/2026</a:t>
             </a:fld>
             <a:endParaRPr lang="en-US"/>
           </a:p>
@@ -1501,7 +1501,7 @@
           <a:p>
             <a:fld id="{5BCAD085-E8A6-8845-BD4E-CB4CCA059FC4}" type="datetimeFigureOut">
               <a:rPr lang="en-US" smtClean="0"/>
-              <a:t>2/20/2026</a:t>
+              <a:t>2/21/2026</a:t>
             </a:fld>
             <a:endParaRPr lang="en-US"/>
           </a:p>
@@ -1828,7 +1828,7 @@
           <a:p>
             <a:fld id="{5BCAD085-E8A6-8845-BD4E-CB4CCA059FC4}" type="datetimeFigureOut">
               <a:rPr lang="en-US" smtClean="0"/>
-              <a:t>2/20/2026</a:t>
+              <a:t>2/21/2026</a:t>
             </a:fld>
             <a:endParaRPr lang="en-US"/>
           </a:p>
@@ -2142,7 +2142,7 @@
           <a:p>
             <a:fld id="{5BCAD085-E8A6-8845-BD4E-CB4CCA059FC4}" type="datetimeFigureOut">
               <a:rPr lang="en-US" smtClean="0"/>
-              <a:t>2/20/2026</a:t>
+              <a:t>2/21/2026</a:t>
             </a:fld>
             <a:endParaRPr lang="en-US"/>
           </a:p>
@@ -2529,7 +2529,7 @@
           <a:p>
             <a:fld id="{5BCAD085-E8A6-8845-BD4E-CB4CCA059FC4}" type="datetimeFigureOut">
               <a:rPr lang="en-US" smtClean="0"/>
-              <a:t>2/20/2026</a:t>
+              <a:t>2/21/2026</a:t>
             </a:fld>
             <a:endParaRPr lang="en-US"/>
           </a:p>
@@ -2699,7 +2699,7 @@
           <a:p>
             <a:fld id="{5BCAD085-E8A6-8845-BD4E-CB4CCA059FC4}" type="datetimeFigureOut">
               <a:rPr lang="en-US" smtClean="0"/>
-              <a:t>2/20/2026</a:t>
+              <a:t>2/21/2026</a:t>
             </a:fld>
             <a:endParaRPr lang="en-US"/>
           </a:p>
@@ -2879,7 +2879,7 @@
           <a:p>
             <a:fld id="{5BCAD085-E8A6-8845-BD4E-CB4CCA059FC4}" type="datetimeFigureOut">
               <a:rPr lang="en-US" smtClean="0"/>
-              <a:t>2/20/2026</a:t>
+              <a:t>2/21/2026</a:t>
             </a:fld>
             <a:endParaRPr lang="en-US"/>
           </a:p>
@@ -3055,7 +3055,7 @@
           <a:p>
             <a:fld id="{5BCAD085-E8A6-8845-BD4E-CB4CCA059FC4}" type="datetimeFigureOut">
               <a:rPr lang="en-US" smtClean="0"/>
-              <a:t>2/20/2026</a:t>
+              <a:t>2/21/2026</a:t>
             </a:fld>
             <a:endParaRPr lang="en-US"/>
           </a:p>
@@ -3299,7 +3299,7 @@
           <a:p>
             <a:fld id="{5BCAD085-E8A6-8845-BD4E-CB4CCA059FC4}" type="datetimeFigureOut">
               <a:rPr lang="en-US" smtClean="0"/>
-              <a:t>2/20/2026</a:t>
+              <a:t>2/21/2026</a:t>
             </a:fld>
             <a:endParaRPr lang="en-US"/>
           </a:p>
@@ -3596,7 +3596,7 @@
           <a:p>
             <a:fld id="{5BCAD085-E8A6-8845-BD4E-CB4CCA059FC4}" type="datetimeFigureOut">
               <a:rPr lang="en-US" smtClean="0"/>
-              <a:t>2/20/2026</a:t>
+              <a:t>2/21/2026</a:t>
             </a:fld>
             <a:endParaRPr lang="en-US"/>
           </a:p>
@@ -3975,7 +3975,7 @@
           <a:p>
             <a:fld id="{5BCAD085-E8A6-8845-BD4E-CB4CCA059FC4}" type="datetimeFigureOut">
               <a:rPr lang="en-US" smtClean="0"/>
-              <a:t>2/20/2026</a:t>
+              <a:t>2/21/2026</a:t>
             </a:fld>
             <a:endParaRPr lang="en-US"/>
           </a:p>
@@ -4098,7 +4098,7 @@
           <a:p>
             <a:fld id="{5BCAD085-E8A6-8845-BD4E-CB4CCA059FC4}" type="datetimeFigureOut">
               <a:rPr lang="en-US" smtClean="0"/>
-              <a:t>2/20/2026</a:t>
+              <a:t>2/21/2026</a:t>
             </a:fld>
             <a:endParaRPr lang="en-US"/>
           </a:p>
@@ -4193,7 +4193,7 @@
           <a:p>
             <a:fld id="{5BCAD085-E8A6-8845-BD4E-CB4CCA059FC4}" type="datetimeFigureOut">
               <a:rPr lang="en-US" smtClean="0"/>
-              <a:t>2/20/2026</a:t>
+              <a:t>2/21/2026</a:t>
             </a:fld>
             <a:endParaRPr lang="en-US"/>
           </a:p>
@@ -4448,7 +4448,7 @@
           <a:p>
             <a:fld id="{5BCAD085-E8A6-8845-BD4E-CB4CCA059FC4}" type="datetimeFigureOut">
               <a:rPr lang="en-US" smtClean="0"/>
-              <a:t>2/20/2026</a:t>
+              <a:t>2/21/2026</a:t>
             </a:fld>
             <a:endParaRPr lang="en-US"/>
           </a:p>
@@ -4711,7 +4711,7 @@
           <a:p>
             <a:fld id="{5BCAD085-E8A6-8845-BD4E-CB4CCA059FC4}" type="datetimeFigureOut">
               <a:rPr lang="en-US" smtClean="0"/>
-              <a:t>2/20/2026</a:t>
+              <a:t>2/21/2026</a:t>
             </a:fld>
             <a:endParaRPr lang="en-US"/>
           </a:p>
@@ -5527,7 +5527,7 @@
           <a:p>
             <a:fld id="{5BCAD085-E8A6-8845-BD4E-CB4CCA059FC4}" type="datetimeFigureOut">
               <a:rPr lang="en-US" smtClean="0"/>
-              <a:t>2/20/2026</a:t>
+              <a:t>2/21/2026</a:t>
             </a:fld>
             <a:endParaRPr lang="en-US"/>
           </a:p>
@@ -7550,13 +7550,11 @@
       </p:grpSpPr>
       <p:pic>
         <p:nvPicPr>
-          <p:cNvPr id="4" name="Content Placeholder 3"/>
+          <p:cNvPr id="2" name="Picture 1"/>
           <p:cNvPicPr>
-            <a:picLocks noGrp="1" noChangeAspect="1"/>
+            <a:picLocks noChangeAspect="1"/>
           </p:cNvPicPr>
-          <p:nvPr>
-            <p:ph idx="4294967295"/>
-          </p:nvPr>
+          <p:nvPr/>
         </p:nvPicPr>
         <p:blipFill>
           <a:blip r:embed="rId2">
@@ -7572,9 +7570,12 @@
         </p:blipFill>
         <p:spPr>
           <a:xfrm>
-            <a:off x="0" y="0"/>
-            <a:ext cx="8697913" cy="6770688"/>
+            <a:off x="676275" y="265043"/>
+            <a:ext cx="7791450" cy="6347792"/>
           </a:xfrm>
+          <a:prstGeom prst="rect">
+            <a:avLst/>
+          </a:prstGeom>
         </p:spPr>
       </p:pic>
     </p:spTree>

</xml_diff>

<commit_message>
docs: update system architecture presentation — refreshed diagrams and layout
</commit_message>
<xml_diff>
--- a/docs/Cloudimart_System_Architecture.pptx
+++ b/docs/Cloudimart_System_Architecture.pptx
@@ -12,14 +12,14 @@
     <p:sldId id="259" r:id="rId6"/>
     <p:sldId id="260" r:id="rId7"/>
     <p:sldId id="272" r:id="rId8"/>
-    <p:sldId id="261" r:id="rId9"/>
-    <p:sldId id="273" r:id="rId10"/>
-    <p:sldId id="262" r:id="rId11"/>
-    <p:sldId id="274" r:id="rId12"/>
-    <p:sldId id="265" r:id="rId13"/>
-    <p:sldId id="275" r:id="rId14"/>
-    <p:sldId id="266" r:id="rId15"/>
-    <p:sldId id="267" r:id="rId16"/>
+    <p:sldId id="277" r:id="rId9"/>
+    <p:sldId id="261" r:id="rId10"/>
+    <p:sldId id="273" r:id="rId11"/>
+    <p:sldId id="262" r:id="rId12"/>
+    <p:sldId id="274" r:id="rId13"/>
+    <p:sldId id="265" r:id="rId14"/>
+    <p:sldId id="275" r:id="rId15"/>
+    <p:sldId id="266" r:id="rId16"/>
     <p:sldId id="276" r:id="rId17"/>
     <p:sldId id="270" r:id="rId18"/>
   </p:sldIdLst>
@@ -6230,6 +6230,72 @@
           <a:chExt cx="0" cy="0"/>
         </a:xfrm>
       </p:grpSpPr>
+      <p:pic>
+        <p:nvPicPr>
+          <p:cNvPr id="4" name="Content Placeholder 3"/>
+          <p:cNvPicPr>
+            <a:picLocks noGrp="1" noChangeAspect="1"/>
+          </p:cNvPicPr>
+          <p:nvPr>
+            <p:ph idx="4294967295"/>
+          </p:nvPr>
+        </p:nvPicPr>
+        <p:blipFill>
+          <a:blip r:embed="rId2">
+            <a:extLst>
+              <a:ext uri="{28A0092B-C50C-407E-A947-70E740481C1C}">
+                <a14:useLocalDpi xmlns:a14="http://schemas.microsoft.com/office/drawing/2010/main" val="0"/>
+              </a:ext>
+            </a:extLst>
+          </a:blip>
+          <a:stretch>
+            <a:fillRect/>
+          </a:stretch>
+        </p:blipFill>
+        <p:spPr>
+          <a:xfrm>
+            <a:off x="406400" y="579438"/>
+            <a:ext cx="8737600" cy="5622925"/>
+          </a:xfrm>
+        </p:spPr>
+      </p:pic>
+    </p:spTree>
+    <p:extLst>
+      <p:ext uri="{BB962C8B-B14F-4D97-AF65-F5344CB8AC3E}">
+        <p14:creationId xmlns:p14="http://schemas.microsoft.com/office/powerpoint/2010/main" val="323182517"/>
+      </p:ext>
+    </p:extLst>
+  </p:cSld>
+  <p:clrMapOvr>
+    <a:masterClrMapping/>
+  </p:clrMapOvr>
+  <p:timing>
+    <p:tnLst>
+      <p:par>
+        <p:cTn id="1" dur="indefinite" restart="never" nodeType="tmRoot"/>
+      </p:par>
+    </p:tnLst>
+  </p:timing>
+</p:sld>
+</file>
+
+<file path=ppt/slides/slide11.xml><?xml version="1.0" encoding="utf-8"?>
+<p:sld xmlns:a="http://schemas.openxmlformats.org/drawingml/2006/main" xmlns:r="http://schemas.openxmlformats.org/officeDocument/2006/relationships" xmlns:p="http://schemas.openxmlformats.org/presentationml/2006/main">
+  <p:cSld>
+    <p:spTree>
+      <p:nvGrpSpPr>
+        <p:cNvPr id="1" name=""/>
+        <p:cNvGrpSpPr/>
+        <p:nvPr/>
+      </p:nvGrpSpPr>
+      <p:grpSpPr>
+        <a:xfrm>
+          <a:off x="0" y="0"/>
+          <a:ext cx="0" cy="0"/>
+          <a:chOff x="0" y="0"/>
+          <a:chExt cx="0" cy="0"/>
+        </a:xfrm>
+      </p:grpSpPr>
       <p:sp>
         <p:nvSpPr>
           <p:cNvPr id="2" name="Title 1"/>
@@ -6354,7 +6420,7 @@
 </p:sld>
 </file>
 
-<file path=ppt/slides/slide11.xml><?xml version="1.0" encoding="utf-8"?>
+<file path=ppt/slides/slide12.xml><?xml version="1.0" encoding="utf-8"?>
 <p:sld xmlns:a="http://schemas.openxmlformats.org/drawingml/2006/main" xmlns:r="http://schemas.openxmlformats.org/officeDocument/2006/relationships" xmlns:p="http://schemas.openxmlformats.org/presentationml/2006/main">
   <p:cSld>
     <p:spTree>
@@ -6420,100 +6486,6 @@
 </p:sld>
 </file>
 
-<file path=ppt/slides/slide12.xml><?xml version="1.0" encoding="utf-8"?>
-<p:sld xmlns:a="http://schemas.openxmlformats.org/drawingml/2006/main" xmlns:r="http://schemas.openxmlformats.org/officeDocument/2006/relationships" xmlns:p="http://schemas.openxmlformats.org/presentationml/2006/main">
-  <p:cSld>
-    <p:spTree>
-      <p:nvGrpSpPr>
-        <p:cNvPr id="1" name=""/>
-        <p:cNvGrpSpPr/>
-        <p:nvPr/>
-      </p:nvGrpSpPr>
-      <p:grpSpPr>
-        <a:xfrm>
-          <a:off x="0" y="0"/>
-          <a:ext cx="0" cy="0"/>
-          <a:chOff x="0" y="0"/>
-          <a:chExt cx="0" cy="0"/>
-        </a:xfrm>
-      </p:grpSpPr>
-      <p:sp>
-        <p:nvSpPr>
-          <p:cNvPr id="2" name="Title 1"/>
-          <p:cNvSpPr>
-            <a:spLocks noGrp="1"/>
-          </p:cNvSpPr>
-          <p:nvPr>
-            <p:ph type="title"/>
-          </p:nvPr>
-        </p:nvSpPr>
-        <p:spPr/>
-        <p:txBody>
-          <a:bodyPr/>
-          <a:lstStyle/>
-          <a:p>
-            <a:r>
-              <a:t>Database Design</a:t>
-            </a:r>
-          </a:p>
-        </p:txBody>
-      </p:sp>
-      <p:sp>
-        <p:nvSpPr>
-          <p:cNvPr id="3" name="Content Placeholder 2"/>
-          <p:cNvSpPr>
-            <a:spLocks noGrp="1"/>
-          </p:cNvSpPr>
-          <p:nvPr>
-            <p:ph idx="1"/>
-          </p:nvPr>
-        </p:nvSpPr>
-        <p:spPr/>
-        <p:txBody>
-          <a:bodyPr/>
-          <a:lstStyle/>
-          <a:p>
-            <a:endParaRPr dirty="0"/>
-          </a:p>
-          <a:p>
-            <a:r>
-              <a:rPr dirty="0"/>
-              <a:t>Key tables: users, locations, products, categories, carts, </a:t>
-            </a:r>
-            <a:r>
-              <a:rPr dirty="0" err="1"/>
-              <a:t>cart_items</a:t>
-            </a:r>
-            <a:r>
-              <a:rPr dirty="0"/>
-              <a:t>, payments, orders, </a:t>
-            </a:r>
-            <a:r>
-              <a:rPr dirty="0" err="1"/>
-              <a:t>order_items</a:t>
-            </a:r>
-            <a:r>
-              <a:rPr dirty="0"/>
-              <a:t>, deliveries</a:t>
-            </a:r>
-          </a:p>
-        </p:txBody>
-      </p:sp>
-    </p:spTree>
-  </p:cSld>
-  <p:clrMapOvr>
-    <a:masterClrMapping/>
-  </p:clrMapOvr>
-  <p:timing>
-    <p:tnLst>
-      <p:par>
-        <p:cTn id="1" dur="indefinite" restart="never" nodeType="tmRoot"/>
-      </p:par>
-    </p:tnLst>
-  </p:timing>
-</p:sld>
-</file>
-
 <file path=ppt/slides/slide13.xml><?xml version="1.0" encoding="utf-8"?>
 <p:sld xmlns:a="http://schemas.openxmlformats.org/drawingml/2006/main" xmlns:r="http://schemas.openxmlformats.org/officeDocument/2006/relationships" xmlns:p="http://schemas.openxmlformats.org/presentationml/2006/main">
   <p:cSld>
@@ -6531,41 +6503,80 @@
           <a:chExt cx="0" cy="0"/>
         </a:xfrm>
       </p:grpSpPr>
-      <p:pic>
-        <p:nvPicPr>
-          <p:cNvPr id="4" name="Content Placeholder 3"/>
-          <p:cNvPicPr>
-            <a:picLocks noGrp="1" noChangeAspect="1"/>
-          </p:cNvPicPr>
-          <p:nvPr>
-            <p:ph idx="4294967295"/>
-          </p:nvPr>
-        </p:nvPicPr>
-        <p:blipFill>
-          <a:blip r:embed="rId2">
-            <a:extLst>
-              <a:ext uri="{28A0092B-C50C-407E-A947-70E740481C1C}">
-                <a14:useLocalDpi xmlns:a14="http://schemas.microsoft.com/office/drawing/2010/main" val="0"/>
-              </a:ext>
-            </a:extLst>
-          </a:blip>
-          <a:stretch>
-            <a:fillRect/>
-          </a:stretch>
-        </p:blipFill>
-        <p:spPr>
-          <a:xfrm>
-            <a:off x="0" y="115888"/>
-            <a:ext cx="7751763" cy="6731000"/>
-          </a:xfrm>
-        </p:spPr>
-      </p:pic>
+      <p:sp>
+        <p:nvSpPr>
+          <p:cNvPr id="2" name="Title 1"/>
+          <p:cNvSpPr>
+            <a:spLocks noGrp="1"/>
+          </p:cNvSpPr>
+          <p:nvPr>
+            <p:ph type="title"/>
+          </p:nvPr>
+        </p:nvSpPr>
+        <p:spPr/>
+        <p:txBody>
+          <a:bodyPr/>
+          <a:lstStyle/>
+          <a:p>
+            <a:r>
+              <a:t>Database Design</a:t>
+            </a:r>
+          </a:p>
+        </p:txBody>
+      </p:sp>
+      <p:sp>
+        <p:nvSpPr>
+          <p:cNvPr id="3" name="Content Placeholder 2"/>
+          <p:cNvSpPr>
+            <a:spLocks noGrp="1"/>
+          </p:cNvSpPr>
+          <p:nvPr>
+            <p:ph idx="1"/>
+          </p:nvPr>
+        </p:nvSpPr>
+        <p:spPr/>
+        <p:txBody>
+          <a:bodyPr/>
+          <a:lstStyle/>
+          <a:p>
+            <a:endParaRPr dirty="0"/>
+          </a:p>
+          <a:p>
+            <a:r>
+              <a:rPr lang="en-US" dirty="0" smtClean="0"/>
+              <a:t>The database follows normalized design with foreign key constraints</a:t>
+            </a:r>
+            <a:endParaRPr lang="en-US" dirty="0" smtClean="0"/>
+          </a:p>
+          <a:p>
+            <a:r>
+              <a:rPr lang="en-US" dirty="0" smtClean="0"/>
+              <a:t>Key tables: users, locations, products, categories, carts, </a:t>
+            </a:r>
+            <a:r>
+              <a:rPr lang="en-US" dirty="0" err="1" smtClean="0"/>
+              <a:t>cart_items</a:t>
+            </a:r>
+            <a:r>
+              <a:rPr lang="en-US" dirty="0" smtClean="0"/>
+              <a:t>, payments, orders, </a:t>
+            </a:r>
+            <a:r>
+              <a:rPr lang="en-US" dirty="0" err="1" smtClean="0"/>
+              <a:t>order_items</a:t>
+            </a:r>
+            <a:r>
+              <a:rPr lang="en-US" dirty="0" smtClean="0"/>
+              <a:t>, deliveries</a:t>
+            </a:r>
+            <a:endParaRPr lang="en-US" dirty="0" smtClean="0"/>
+          </a:p>
+          <a:p>
+            <a:endParaRPr dirty="0"/>
+          </a:p>
+        </p:txBody>
+      </p:sp>
     </p:spTree>
-    <p:extLst>
-      <p:ext uri="{BB962C8B-B14F-4D97-AF65-F5344CB8AC3E}">
-        <p14:creationId xmlns:p14="http://schemas.microsoft.com/office/powerpoint/2010/main" val="1021224362"/>
-      </p:ext>
-    </p:extLst>
   </p:cSld>
   <p:clrMapOvr>
     <a:masterClrMapping/>
@@ -6607,71 +6618,59 @@
             <p:ph type="title"/>
           </p:nvPr>
         </p:nvSpPr>
-        <p:spPr/>
+        <p:spPr>
+          <a:xfrm>
+            <a:off x="99390" y="2676939"/>
+            <a:ext cx="1020418" cy="1320800"/>
+          </a:xfrm>
+        </p:spPr>
         <p:txBody>
           <a:bodyPr/>
           <a:lstStyle/>
           <a:p>
             <a:r>
-              <a:t>Key Design Decisions</a:t>
-            </a:r>
-          </a:p>
-        </p:txBody>
-      </p:sp>
-      <p:sp>
-        <p:nvSpPr>
-          <p:cNvPr id="3" name="Content Placeholder 2"/>
-          <p:cNvSpPr>
-            <a:spLocks noGrp="1"/>
-          </p:cNvSpPr>
-          <p:nvPr>
-            <p:ph idx="1"/>
-          </p:nvPr>
-        </p:nvSpPr>
-        <p:spPr/>
-        <p:txBody>
-          <a:bodyPr>
-            <a:normAutofit fontScale="92500" lnSpcReduction="20000"/>
-          </a:bodyPr>
-          <a:lstStyle/>
-          <a:p>
-            <a:r>
-              <a:t>Backend‑first development: Core business rules enforced server‑side</a:t>
-            </a:r>
-          </a:p>
-          <a:p>
-            <a:r>
-              <a:t>Radius‑based geofencing: Simple, maintainable, accurate for campus</a:t>
-            </a:r>
-          </a:p>
-          <a:p>
-            <a:r>
-              <a:t>Stateless API with Sanctum tokens: Enables horizontal scaling</a:t>
-            </a:r>
-          </a:p>
-          <a:p>
-            <a:r>
-              <a:t>Human‑readable order ID: Easy for customers and support</a:t>
-            </a:r>
-          </a:p>
-          <a:p>
-            <a:r>
-              <a:t>Cart snapshot in payments: Prevents price/stock changes after payment</a:t>
-            </a:r>
-          </a:p>
-          <a:p>
-            <a:r>
-              <a:t>Row locking for stock: Prevents overselling under concurrent requests</a:t>
-            </a:r>
-          </a:p>
-          <a:p>
-            <a:r>
-              <a:t>Server‑trusted location verification: Reduces friction for returning users</a:t>
-            </a:r>
-          </a:p>
-        </p:txBody>
-      </p:sp>
+              <a:rPr lang="en-US" dirty="0" smtClean="0"/>
+              <a:t>ERD</a:t>
+            </a:r>
+            <a:endParaRPr lang="en-US" dirty="0"/>
+          </a:p>
+        </p:txBody>
+      </p:sp>
+      <p:pic>
+        <p:nvPicPr>
+          <p:cNvPr id="4" name="Content Placeholder 3"/>
+          <p:cNvPicPr>
+            <a:picLocks noGrp="1" noChangeAspect="1"/>
+          </p:cNvPicPr>
+          <p:nvPr>
+            <p:ph idx="4294967295"/>
+          </p:nvPr>
+        </p:nvPicPr>
+        <p:blipFill>
+          <a:blip r:embed="rId2">
+            <a:extLst>
+              <a:ext uri="{28A0092B-C50C-407E-A947-70E740481C1C}">
+                <a14:useLocalDpi xmlns:a14="http://schemas.microsoft.com/office/drawing/2010/main" val="0"/>
+              </a:ext>
+            </a:extLst>
+          </a:blip>
+          <a:stretch>
+            <a:fillRect/>
+          </a:stretch>
+        </p:blipFill>
+        <p:spPr>
+          <a:xfrm>
+            <a:off x="1392238" y="115888"/>
+            <a:ext cx="7751762" cy="6731000"/>
+          </a:xfrm>
+        </p:spPr>
+      </p:pic>
     </p:spTree>
+    <p:extLst>
+      <p:ext uri="{BB962C8B-B14F-4D97-AF65-F5344CB8AC3E}">
+        <p14:creationId xmlns:p14="http://schemas.microsoft.com/office/powerpoint/2010/main" val="1021224362"/>
+      </p:ext>
+    </p:extLst>
   </p:cSld>
   <p:clrMapOvr>
     <a:masterClrMapping/>
@@ -6719,7 +6718,7 @@
           <a:lstStyle/>
           <a:p>
             <a:r>
-              <a:t>Info‑Driven Design</a:t>
+              <a:t>Key Design Decisions</a:t>
             </a:r>
           </a:p>
         </p:txBody>
@@ -6737,52 +6736,68 @@
         <p:spPr/>
         <p:txBody>
           <a:bodyPr>
-            <a:normAutofit/>
+            <a:normAutofit fontScale="92500" lnSpcReduction="10000"/>
           </a:bodyPr>
           <a:lstStyle/>
           <a:p>
             <a:r>
               <a:rPr dirty="0"/>
-              <a:t>Brand alignment: Analyzed live </a:t>
+              <a:t>Backend‑first development: Core business rules enforced server‑side</a:t>
+            </a:r>
+          </a:p>
+          <a:p>
+            <a:r>
+              <a:rPr dirty="0"/>
+              <a:t>Radius‑based </a:t>
             </a:r>
             <a:r>
               <a:rPr dirty="0" err="1"/>
-              <a:t>Cloudimart</a:t>
+              <a:t>geofencing</a:t>
             </a:r>
             <a:r>
               <a:rPr dirty="0"/>
-              <a:t> site for colors, navigation, terminology</a:t>
+              <a:t>: Simple, maintainable, accurate for campus</a:t>
             </a:r>
           </a:p>
           <a:p>
             <a:r>
               <a:rPr dirty="0"/>
-              <a:t>User expectations: Researched </a:t>
-            </a:r>
-            <a:r>
-              <a:rPr dirty="0" err="1"/>
-              <a:t>Jumia</a:t>
-            </a:r>
+              <a:t>Stateless API with Sanctum tokens: Enables horizontal scaling</a:t>
+            </a:r>
+          </a:p>
+          <a:p>
             <a:r>
               <a:rPr dirty="0"/>
-              <a:t>/Amazon for checkout and cart patterns</a:t>
+              <a:t>Human‑readable order ID: Easy for customers and support</a:t>
             </a:r>
           </a:p>
           <a:p>
             <a:r>
               <a:rPr dirty="0" smtClean="0"/>
-              <a:t>Cart </a:t>
+              <a:t>Row </a:t>
             </a:r>
             <a:r>
               <a:rPr dirty="0"/>
-              <a:t>behavior: Single persistent cart per user (merged on login)</a:t>
-            </a:r>
-          </a:p>
-          <a:p>
-            <a:r>
-              <a:rPr dirty="0"/>
-              <a:t>Stock awareness: Add-to-cart disabled when insufficient stock with clear messaging</a:t>
-            </a:r>
+              <a:t>locking for stock: Prevents overselling under concurrent </a:t>
+            </a:r>
+            <a:r>
+              <a:rPr dirty="0" smtClean="0"/>
+              <a:t>requests</a:t>
+            </a:r>
+            <a:endParaRPr lang="en-US" dirty="0" smtClean="0"/>
+          </a:p>
+          <a:p>
+            <a:r>
+              <a:rPr lang="en-US" dirty="0" smtClean="0"/>
+              <a:t>Information driven design approach, instead of inventing features arbitrarily</a:t>
+            </a:r>
+          </a:p>
+          <a:p>
+            <a:r>
+              <a:rPr lang="en-US" dirty="0" smtClean="0"/>
+              <a:t>Security by design</a:t>
+            </a:r>
+            <a:endParaRPr dirty="0"/>
           </a:p>
         </p:txBody>
       </p:sp>
@@ -6881,6 +6896,13 @@
   <p:clrMapOvr>
     <a:masterClrMapping/>
   </p:clrMapOvr>
+  <p:timing>
+    <p:tnLst>
+      <p:par>
+        <p:cTn id="1" dur="indefinite" restart="never" nodeType="tmRoot"/>
+      </p:par>
+    </p:tnLst>
+  </p:timing>
 </p:sld>
 </file>
 
@@ -6933,6 +6955,13 @@
   <p:clrMapOvr>
     <a:masterClrMapping/>
   </p:clrMapOvr>
+  <p:timing>
+    <p:tnLst>
+      <p:par>
+        <p:cTn id="1" dur="indefinite" restart="never" nodeType="tmRoot"/>
+      </p:par>
+    </p:tnLst>
+  </p:timing>
 </p:sld>
 </file>
 
@@ -7014,7 +7043,21 @@
             </a:r>
             <a:r>
               <a:rPr sz="2800" dirty="0"/>
-              <a:t> backend serving a REST API and a Next.js frontend consuming that API. This separation allows independent scaling and follows modern best practices. The prototype focuses on core e‑commerce flows with location‑restricted checkout for the </a:t>
+              <a:t> backend serving a REST API and a Next.js frontend consuming that API. This separation allows independent scaling and follows modern best practices. </a:t>
+            </a:r>
+            <a:endParaRPr lang="en-US" sz="2800" dirty="0" smtClean="0"/>
+          </a:p>
+          <a:p>
+            <a:pPr algn="l">
+              <a:defRPr sz="1400"/>
+            </a:pPr>
+            <a:r>
+              <a:rPr sz="2800" dirty="0" smtClean="0"/>
+              <a:t>The </a:t>
+            </a:r>
+            <a:r>
+              <a:rPr sz="2800" dirty="0"/>
+              <a:t>prototype focuses on core e‑commerce flows with location‑restricted checkout for the </a:t>
             </a:r>
             <a:r>
               <a:rPr sz="2800" dirty="0" err="1"/>
@@ -7022,8 +7065,21 @@
             </a:r>
             <a:r>
               <a:rPr sz="2800" dirty="0"/>
-              <a:t> University community."</a:t>
-            </a:r>
+              <a:t> University </a:t>
+            </a:r>
+            <a:r>
+              <a:rPr sz="2800" dirty="0" smtClean="0"/>
+              <a:t>community</a:t>
+            </a:r>
+            <a:r>
+              <a:rPr lang="en-US" sz="2800" dirty="0" smtClean="0"/>
+              <a:t> areas</a:t>
+            </a:r>
+            <a:r>
+              <a:rPr sz="2800" dirty="0" smtClean="0"/>
+              <a:t>.</a:t>
+            </a:r>
+            <a:endParaRPr sz="2800" dirty="0"/>
           </a:p>
         </p:txBody>
       </p:sp>
@@ -7216,12 +7272,14 @@
         </p:nvSpPr>
         <p:spPr>
           <a:xfrm>
-            <a:off x="457200" y="274638"/>
-            <a:ext cx="8229600" cy="812040"/>
+            <a:off x="205409" y="2063680"/>
+            <a:ext cx="3920272" cy="1116841"/>
           </a:xfrm>
         </p:spPr>
         <p:txBody>
-          <a:bodyPr/>
+          <a:bodyPr>
+            <a:normAutofit fontScale="90000"/>
+          </a:bodyPr>
           <a:lstStyle/>
           <a:p>
             <a:r>
@@ -7255,8 +7313,8 @@
         </p:blipFill>
         <p:spPr>
           <a:xfrm>
-            <a:off x="772881" y="835370"/>
-            <a:ext cx="4660509" cy="5774082"/>
+            <a:off x="3661855" y="371543"/>
+            <a:ext cx="5069702" cy="6281047"/>
           </a:xfrm>
         </p:spPr>
       </p:pic>
@@ -7615,9 +7673,39 @@
           <a:chExt cx="0" cy="0"/>
         </a:xfrm>
       </p:grpSpPr>
-      <p:sp>
-        <p:nvSpPr>
-          <p:cNvPr id="2" name="Title 1"/>
+      <p:pic>
+        <p:nvPicPr>
+          <p:cNvPr id="3" name="Picture 2"/>
+          <p:cNvPicPr>
+            <a:picLocks noChangeAspect="1"/>
+          </p:cNvPicPr>
+          <p:nvPr/>
+        </p:nvPicPr>
+        <p:blipFill>
+          <a:blip r:embed="rId2">
+            <a:extLst>
+              <a:ext uri="{28A0092B-C50C-407E-A947-70E740481C1C}">
+                <a14:useLocalDpi xmlns:a14="http://schemas.microsoft.com/office/drawing/2010/main" val="0"/>
+              </a:ext>
+            </a:extLst>
+          </a:blip>
+          <a:stretch>
+            <a:fillRect/>
+          </a:stretch>
+        </p:blipFill>
+        <p:spPr>
+          <a:xfrm>
+            <a:off x="2758406" y="0"/>
+            <a:ext cx="6332507" cy="6858000"/>
+          </a:xfrm>
+          <a:prstGeom prst="rect">
+            <a:avLst/>
+          </a:prstGeom>
+        </p:spPr>
+      </p:pic>
+      <p:sp>
+        <p:nvSpPr>
+          <p:cNvPr id="4" name="Title 3"/>
           <p:cNvSpPr>
             <a:spLocks noGrp="1"/>
           </p:cNvSpPr>
@@ -7625,113 +7713,32 @@
             <p:ph type="title"/>
           </p:nvPr>
         </p:nvSpPr>
-        <p:spPr/>
+        <p:spPr>
+          <a:xfrm>
+            <a:off x="424068" y="2239617"/>
+            <a:ext cx="1828801" cy="1320800"/>
+          </a:xfrm>
+        </p:spPr>
         <p:txBody>
           <a:bodyPr>
-            <a:normAutofit/>
+            <a:normAutofit fontScale="90000"/>
           </a:bodyPr>
           <a:lstStyle/>
           <a:p>
             <a:r>
-              <a:rPr dirty="0"/>
-              <a:t>Location </a:t>
-            </a:r>
-            <a:r>
-              <a:rPr dirty="0" smtClean="0"/>
-              <a:t>Validation </a:t>
-            </a:r>
-            <a:r>
               <a:rPr lang="en-US" dirty="0" smtClean="0"/>
-              <a:t>and </a:t>
-            </a:r>
-            <a:r>
-              <a:rPr dirty="0" smtClean="0"/>
-              <a:t>How </a:t>
-            </a:r>
-            <a:r>
-              <a:rPr dirty="0"/>
-              <a:t>It Works</a:t>
-            </a:r>
-          </a:p>
-        </p:txBody>
-      </p:sp>
-      <p:sp>
-        <p:nvSpPr>
-          <p:cNvPr id="3" name="Content Placeholder 2"/>
-          <p:cNvSpPr>
-            <a:spLocks noGrp="1"/>
-          </p:cNvSpPr>
-          <p:nvPr>
-            <p:ph idx="1"/>
-          </p:nvPr>
-        </p:nvSpPr>
-        <p:spPr/>
-        <p:txBody>
-          <a:bodyPr>
-            <a:normAutofit/>
-          </a:bodyPr>
-          <a:lstStyle/>
-          <a:p>
-            <a:r>
-              <a:rPr dirty="0"/>
-              <a:t>Radius‑based </a:t>
-            </a:r>
-            <a:r>
-              <a:rPr dirty="0" err="1"/>
-              <a:t>geofencing</a:t>
-            </a:r>
-            <a:r>
-              <a:rPr dirty="0"/>
-              <a:t> using </a:t>
-            </a:r>
-            <a:r>
-              <a:rPr dirty="0" err="1"/>
-              <a:t>Haversine</a:t>
-            </a:r>
-            <a:r>
-              <a:rPr dirty="0"/>
-              <a:t> formula</a:t>
-            </a:r>
-          </a:p>
-          <a:p>
-            <a:r>
-              <a:rPr dirty="0"/>
-              <a:t>Each delivery zone defined by a center point + radius (1.0–1.8 km)</a:t>
-            </a:r>
-          </a:p>
-          <a:p>
-            <a:r>
-              <a:rPr dirty="0"/>
-              <a:t>User's GPS compared to all active zones; if within any radius </a:t>
-            </a:r>
-            <a:r>
-              <a:rPr lang="en-US" dirty="0" smtClean="0"/>
-              <a:t>then </a:t>
-            </a:r>
-            <a:r>
-              <a:rPr dirty="0" smtClean="0"/>
-              <a:t>checkout </a:t>
-            </a:r>
-            <a:r>
-              <a:rPr dirty="0"/>
-              <a:t>allowed</a:t>
-            </a:r>
-          </a:p>
-          <a:p>
-            <a:r>
-              <a:rPr dirty="0"/>
-              <a:t>Server‑side validation ensures rules cannot be bypassed</a:t>
-            </a:r>
-          </a:p>
-          <a:p>
-            <a:r>
-              <a:rPr dirty="0"/>
-              <a:t>Coordinates collected manually via Google Maps pin‑drops and seeded in database</a:t>
-            </a:r>
+              <a:t>Class diagram</a:t>
+            </a:r>
+            <a:endParaRPr lang="en-US" dirty="0"/>
           </a:p>
         </p:txBody>
       </p:sp>
     </p:spTree>
+    <p:extLst>
+      <p:ext uri="{BB962C8B-B14F-4D97-AF65-F5344CB8AC3E}">
+        <p14:creationId xmlns:p14="http://schemas.microsoft.com/office/powerpoint/2010/main" val="3509334532"/>
+      </p:ext>
+    </p:extLst>
   </p:cSld>
   <p:clrMapOvr>
     <a:masterClrMapping/>
@@ -7763,41 +7770,123 @@
           <a:chExt cx="0" cy="0"/>
         </a:xfrm>
       </p:grpSpPr>
-      <p:pic>
-        <p:nvPicPr>
-          <p:cNvPr id="4" name="Content Placeholder 3"/>
-          <p:cNvPicPr>
-            <a:picLocks noGrp="1" noChangeAspect="1"/>
-          </p:cNvPicPr>
-          <p:nvPr>
-            <p:ph idx="4294967295"/>
-          </p:nvPr>
-        </p:nvPicPr>
-        <p:blipFill>
-          <a:blip r:embed="rId2">
-            <a:extLst>
-              <a:ext uri="{28A0092B-C50C-407E-A947-70E740481C1C}">
-                <a14:useLocalDpi xmlns:a14="http://schemas.microsoft.com/office/drawing/2010/main" val="0"/>
-              </a:ext>
-            </a:extLst>
-          </a:blip>
-          <a:stretch>
-            <a:fillRect/>
-          </a:stretch>
-        </p:blipFill>
-        <p:spPr>
-          <a:xfrm>
-            <a:off x="406400" y="579438"/>
-            <a:ext cx="8737600" cy="5622925"/>
-          </a:xfrm>
-        </p:spPr>
-      </p:pic>
+      <p:sp>
+        <p:nvSpPr>
+          <p:cNvPr id="2" name="Title 1"/>
+          <p:cNvSpPr>
+            <a:spLocks noGrp="1"/>
+          </p:cNvSpPr>
+          <p:nvPr>
+            <p:ph type="title"/>
+          </p:nvPr>
+        </p:nvSpPr>
+        <p:spPr/>
+        <p:txBody>
+          <a:bodyPr>
+            <a:normAutofit/>
+          </a:bodyPr>
+          <a:lstStyle/>
+          <a:p>
+            <a:r>
+              <a:rPr dirty="0"/>
+              <a:t>Location </a:t>
+            </a:r>
+            <a:r>
+              <a:rPr dirty="0" smtClean="0"/>
+              <a:t>Validation </a:t>
+            </a:r>
+            <a:r>
+              <a:rPr lang="en-US" dirty="0" smtClean="0"/>
+              <a:t>and </a:t>
+            </a:r>
+            <a:r>
+              <a:rPr dirty="0" smtClean="0"/>
+              <a:t>How </a:t>
+            </a:r>
+            <a:r>
+              <a:rPr dirty="0"/>
+              <a:t>It Works</a:t>
+            </a:r>
+          </a:p>
+        </p:txBody>
+      </p:sp>
+      <p:sp>
+        <p:nvSpPr>
+          <p:cNvPr id="3" name="Content Placeholder 2"/>
+          <p:cNvSpPr>
+            <a:spLocks noGrp="1"/>
+          </p:cNvSpPr>
+          <p:nvPr>
+            <p:ph idx="1"/>
+          </p:nvPr>
+        </p:nvSpPr>
+        <p:spPr/>
+        <p:txBody>
+          <a:bodyPr>
+            <a:normAutofit/>
+          </a:bodyPr>
+          <a:lstStyle/>
+          <a:p>
+            <a:r>
+              <a:rPr dirty="0"/>
+              <a:t>Radius‑based </a:t>
+            </a:r>
+            <a:r>
+              <a:rPr dirty="0" err="1"/>
+              <a:t>geofencing</a:t>
+            </a:r>
+            <a:r>
+              <a:rPr dirty="0"/>
+              <a:t> using </a:t>
+            </a:r>
+            <a:r>
+              <a:rPr dirty="0" err="1"/>
+              <a:t>Haversine</a:t>
+            </a:r>
+            <a:r>
+              <a:rPr dirty="0"/>
+              <a:t> formula</a:t>
+            </a:r>
+          </a:p>
+          <a:p>
+            <a:r>
+              <a:rPr dirty="0"/>
+              <a:t>Each delivery zone defined by a center point + radius (1.0–1.8 km)</a:t>
+            </a:r>
+          </a:p>
+          <a:p>
+            <a:r>
+              <a:rPr dirty="0"/>
+              <a:t>User's GPS compared to all active zones; if within any radius </a:t>
+            </a:r>
+            <a:r>
+              <a:rPr lang="en-US" dirty="0" smtClean="0"/>
+              <a:t>then </a:t>
+            </a:r>
+            <a:r>
+              <a:rPr dirty="0" smtClean="0"/>
+              <a:t>checkout </a:t>
+            </a:r>
+            <a:r>
+              <a:rPr dirty="0"/>
+              <a:t>allowed</a:t>
+            </a:r>
+          </a:p>
+          <a:p>
+            <a:r>
+              <a:rPr dirty="0"/>
+              <a:t>Server‑side validation ensures rules cannot be bypassed</a:t>
+            </a:r>
+          </a:p>
+          <a:p>
+            <a:r>
+              <a:rPr dirty="0"/>
+              <a:t>Coordinates collected manually via Google Maps pin‑drops and seeded in database</a:t>
+            </a:r>
+          </a:p>
+        </p:txBody>
+      </p:sp>
     </p:spTree>
-    <p:extLst>
-      <p:ext uri="{BB962C8B-B14F-4D97-AF65-F5344CB8AC3E}">
-        <p14:creationId xmlns:p14="http://schemas.microsoft.com/office/powerpoint/2010/main" val="323182517"/>
-      </p:ext>
-    </p:extLst>
   </p:cSld>
   <p:clrMapOvr>
     <a:masterClrMapping/>

</xml_diff>